<commit_message>
Good version of presentation
</commit_message>
<xml_diff>
--- a/thesis/presentations/2 second/secondv2.pptx
+++ b/thesis/presentations/2 second/secondv2.pptx
@@ -143,7 +143,7 @@
   </p:defaultTextStyle>
   <p:extLst>
     <p:ext uri="{EFAFB233-063F-42B5-8137-9DF3F51BA10A}">
-      <p15:sldGuideLst xmlns:p15="http://schemas.microsoft.com/office/powerpoint/2012/main" xmlns="">
+      <p15:sldGuideLst xmlns="" xmlns:p15="http://schemas.microsoft.com/office/powerpoint/2012/main">
         <p15:guide id="1" orient="horz" pos="2160" userDrawn="1">
           <p15:clr>
             <a:srgbClr val="A4A3A4"/>
@@ -452,11 +452,11 @@
           <c:showBubbleSize val="0"/>
         </c:dLbls>
         <c:gapWidth val="150"/>
-        <c:axId val="463327232"/>
-        <c:axId val="463329152"/>
+        <c:axId val="133916544"/>
+        <c:axId val="133922816"/>
       </c:barChart>
       <c:catAx>
-        <c:axId val="463327232"/>
+        <c:axId val="133916544"/>
         <c:scaling>
           <c:orientation val="minMax"/>
         </c:scaling>
@@ -486,7 +486,7 @@
         <c:majorTickMark val="out"/>
         <c:minorTickMark val="none"/>
         <c:tickLblPos val="nextTo"/>
-        <c:crossAx val="463329152"/>
+        <c:crossAx val="133922816"/>
         <c:crosses val="autoZero"/>
         <c:auto val="1"/>
         <c:lblAlgn val="ctr"/>
@@ -494,7 +494,7 @@
         <c:noMultiLvlLbl val="0"/>
       </c:catAx>
       <c:valAx>
-        <c:axId val="463329152"/>
+        <c:axId val="133922816"/>
         <c:scaling>
           <c:orientation val="minMax"/>
         </c:scaling>
@@ -525,7 +525,7 @@
         <c:majorTickMark val="out"/>
         <c:minorTickMark val="none"/>
         <c:tickLblPos val="nextTo"/>
-        <c:crossAx val="463327232"/>
+        <c:crossAx val="133916544"/>
         <c:crosses val="autoZero"/>
         <c:crossBetween val="between"/>
       </c:valAx>
@@ -4946,7 +4946,7 @@
   </p:clrMapOvr>
   <p:extLst mod="1">
     <p:ext uri="{DCECCB84-F9BA-43D5-87BE-67443E8EF086}">
-      <p15:sldGuideLst xmlns:p15="http://schemas.microsoft.com/office/powerpoint/2012/main" xmlns="">
+      <p15:sldGuideLst xmlns="" xmlns:p15="http://schemas.microsoft.com/office/powerpoint/2012/main">
         <p15:guide id="1" orient="horz" pos="3929" userDrawn="1">
           <p15:clr>
             <a:srgbClr val="FBAE40"/>
@@ -5257,7 +5257,7 @@
   </p:clrMapOvr>
   <p:extLst mod="1">
     <p:ext uri="{DCECCB84-F9BA-43D5-87BE-67443E8EF086}">
-      <p15:sldGuideLst xmlns:p15="http://schemas.microsoft.com/office/powerpoint/2012/main" xmlns="">
+      <p15:sldGuideLst xmlns="" xmlns:p15="http://schemas.microsoft.com/office/powerpoint/2012/main">
         <p15:guide id="1" orient="horz" pos="3929">
           <p15:clr>
             <a:srgbClr val="FBAE40"/>
@@ -5610,7 +5610,7 @@
   </p:clrMapOvr>
   <p:extLst mod="1">
     <p:ext uri="{DCECCB84-F9BA-43D5-87BE-67443E8EF086}">
-      <p15:sldGuideLst xmlns:p15="http://schemas.microsoft.com/office/powerpoint/2012/main" xmlns="">
+      <p15:sldGuideLst xmlns="" xmlns:p15="http://schemas.microsoft.com/office/powerpoint/2012/main">
         <p15:guide id="1" orient="horz" pos="2160">
           <p15:clr>
             <a:srgbClr val="FBAE40"/>
@@ -5917,7 +5917,7 @@
   </p:clrMapOvr>
   <p:extLst mod="1">
     <p:ext uri="{DCECCB84-F9BA-43D5-87BE-67443E8EF086}">
-      <p15:sldGuideLst xmlns:p15="http://schemas.microsoft.com/office/powerpoint/2012/main" xmlns="">
+      <p15:sldGuideLst xmlns="" xmlns:p15="http://schemas.microsoft.com/office/powerpoint/2012/main">
         <p15:guide id="1" orient="horz" pos="2160">
           <p15:clr>
             <a:srgbClr val="FBAE40"/>
@@ -6477,7 +6477,7 @@
   </p:clrMapOvr>
   <p:extLst mod="1">
     <p:ext uri="{DCECCB84-F9BA-43D5-87BE-67443E8EF086}">
-      <p15:sldGuideLst xmlns:p15="http://schemas.microsoft.com/office/powerpoint/2012/main" xmlns="">
+      <p15:sldGuideLst xmlns="" xmlns:p15="http://schemas.microsoft.com/office/powerpoint/2012/main">
         <p15:guide id="1" orient="horz" pos="2160" userDrawn="1">
           <p15:clr>
             <a:srgbClr val="FBAE40"/>
@@ -6808,7 +6808,7 @@
   </p:clrMapOvr>
   <p:extLst mod="1">
     <p:ext uri="{DCECCB84-F9BA-43D5-87BE-67443E8EF086}">
-      <p15:sldGuideLst xmlns:p15="http://schemas.microsoft.com/office/powerpoint/2012/main" xmlns="">
+      <p15:sldGuideLst xmlns="" xmlns:p15="http://schemas.microsoft.com/office/powerpoint/2012/main">
         <p15:guide id="1" orient="horz" pos="2160" userDrawn="1">
           <p15:clr>
             <a:srgbClr val="FBAE40"/>
@@ -8435,7 +8435,7 @@
   </p:txStyles>
   <p:extLst mod="1">
     <p:ext uri="{27BBF7A9-308A-43DC-89C8-2F10F3537804}">
-      <p15:sldGuideLst xmlns:p15="http://schemas.microsoft.com/office/powerpoint/2012/main" xmlns="">
+      <p15:sldGuideLst xmlns="" xmlns:p15="http://schemas.microsoft.com/office/powerpoint/2012/main">
         <p15:guide id="1" orient="horz" pos="3816" userDrawn="1">
           <p15:clr>
             <a:srgbClr val="F26B43"/>
@@ -9067,7 +9067,7 @@
   </p:txStyles>
   <p:extLst mod="1">
     <p:ext uri="{27BBF7A9-308A-43DC-89C8-2F10F3537804}">
-      <p15:sldGuideLst xmlns:p15="http://schemas.microsoft.com/office/powerpoint/2012/main" xmlns="">
+      <p15:sldGuideLst xmlns="" xmlns:p15="http://schemas.microsoft.com/office/powerpoint/2012/main">
         <p15:guide id="1" orient="horz" pos="1026" userDrawn="1">
           <p15:clr>
             <a:srgbClr val="F26B43"/>
@@ -27628,14 +27628,14 @@
           <p:nvPr>
             <p:extLst>
               <p:ext uri="{D42A27DB-BD31-4B8C-83A1-F6EECF244321}">
-                <p14:modId xmlns:p14="http://schemas.microsoft.com/office/powerpoint/2010/main" val="1694972411"/>
+                <p14:modId xmlns:p14="http://schemas.microsoft.com/office/powerpoint/2010/main" val="1320477824"/>
               </p:ext>
             </p:extLst>
           </p:nvPr>
         </p:nvGraphicFramePr>
         <p:xfrm>
-          <a:off x="1237378" y="1274904"/>
-          <a:ext cx="6669244" cy="4738064"/>
+          <a:off x="266075" y="1090450"/>
+          <a:ext cx="8611850" cy="4951535"/>
         </p:xfrm>
         <a:graphic>
           <a:graphicData uri="http://schemas.openxmlformats.org/drawingml/2006/table">
@@ -27644,20 +27644,20 @@
                 <a:tableStyleId>{5C22544A-7EE6-4342-B048-85BDC9FD1C3A}</a:tableStyleId>
               </a:tblPr>
               <a:tblGrid>
-                <a:gridCol w="2841852"/>
-                <a:gridCol w="3827392"/>
+                <a:gridCol w="2500274"/>
+                <a:gridCol w="6111576"/>
               </a:tblGrid>
-              <a:tr h="433552">
+              <a:tr h="426686">
                 <a:tc>
                   <a:txBody>
                     <a:bodyPr/>
                     <a:lstStyle/>
                     <a:p>
                       <a:pPr algn="ctr"/>
-                      <a:endParaRPr lang="nl-BE" dirty="0"/>
+                      <a:endParaRPr lang="nl-BE" sz="2000" dirty="0"/>
                     </a:p>
                   </a:txBody>
-                  <a:tcPr/>
+                  <a:tcPr marL="101377" marR="101377" marT="50688" marB="50688"/>
                 </a:tc>
                 <a:tc>
                   <a:txBody>
@@ -27666,16 +27666,16 @@
                     <a:p>
                       <a:pPr algn="ctr"/>
                       <a:r>
-                        <a:rPr lang="nl-BE" dirty="0" smtClean="0"/>
+                        <a:rPr lang="nl-BE" sz="2000" dirty="0" smtClean="0"/>
                         <a:t>ProbLog2</a:t>
                       </a:r>
-                      <a:endParaRPr lang="nl-BE" dirty="0"/>
+                      <a:endParaRPr lang="nl-BE" sz="2000" dirty="0"/>
                     </a:p>
                   </a:txBody>
-                  <a:tcPr/>
+                  <a:tcPr marL="101377" marR="101377" marT="50688" marB="50688"/>
                 </a:tc>
               </a:tr>
-              <a:tr h="433552">
+              <a:tr h="1387258">
                 <a:tc>
                   <a:txBody>
                     <a:bodyPr/>
@@ -27683,13 +27683,13 @@
                     <a:p>
                       <a:pPr algn="ctr"/>
                       <a:r>
-                        <a:rPr lang="nl-BE" dirty="0" err="1" smtClean="0"/>
+                        <a:rPr lang="nl-BE" sz="2000" dirty="0" err="1" smtClean="0"/>
                         <a:t>Performantie</a:t>
                       </a:r>
-                      <a:endParaRPr lang="nl-BE" dirty="0"/>
+                      <a:endParaRPr lang="nl-BE" sz="2000" dirty="0"/>
                     </a:p>
                   </a:txBody>
-                  <a:tcPr/>
+                  <a:tcPr marL="101377" marR="101377" marT="50688" marB="50688" anchor="ctr"/>
                 </a:tc>
                 <a:tc>
                   <a:txBody>
@@ -27701,7 +27701,7 @@
                         <a:buChar char="•"/>
                       </a:pPr>
                       <a:r>
-                        <a:rPr lang="nl-BE" sz="1400" dirty="0" smtClean="0">
+                        <a:rPr lang="nl-BE" sz="2000" dirty="0" smtClean="0">
                           <a:solidFill>
                             <a:srgbClr val="FF0000"/>
                           </a:solidFill>
@@ -27709,7 +27709,7 @@
                         <a:t>Exacte</a:t>
                       </a:r>
                       <a:r>
-                        <a:rPr lang="nl-BE" sz="1400" baseline="0" dirty="0" smtClean="0">
+                        <a:rPr lang="nl-BE" sz="2000" baseline="0" dirty="0" smtClean="0">
                           <a:solidFill>
                             <a:srgbClr val="FF0000"/>
                           </a:solidFill>
@@ -27717,7 +27717,7 @@
                         <a:t> inferentie o</a:t>
                       </a:r>
                       <a:r>
-                        <a:rPr lang="nl-BE" sz="1400" dirty="0" smtClean="0">
+                        <a:rPr lang="nl-BE" sz="2000" dirty="0" smtClean="0">
                           <a:solidFill>
                             <a:srgbClr val="FF0000"/>
                           </a:solidFill>
@@ -27725,14 +27725,14 @@
                         <a:t>nmogelijk voor 10x10 borden, of voor alle initiële </a:t>
                       </a:r>
                       <a:r>
-                        <a:rPr lang="nl-BE" sz="1400" baseline="0" dirty="0" smtClean="0">
+                        <a:rPr lang="nl-BE" sz="2000" baseline="0" dirty="0" smtClean="0">
                           <a:solidFill>
                             <a:srgbClr val="FF0000"/>
                           </a:solidFill>
                         </a:rPr>
                         <a:t>bord configuraties, of voor 10 beurten</a:t>
                       </a:r>
-                      <a:endParaRPr lang="nl-BE" sz="1400" dirty="0" smtClean="0">
+                      <a:endParaRPr lang="nl-BE" sz="2000" dirty="0" smtClean="0">
                         <a:solidFill>
                           <a:schemeClr val="dk1"/>
                         </a:solidFill>
@@ -27744,7 +27744,7 @@
                         <a:buChar char="•"/>
                       </a:pPr>
                       <a:r>
-                        <a:rPr lang="nl-BE" sz="1400" dirty="0" smtClean="0">
+                        <a:rPr lang="nl-BE" sz="2000" dirty="0" smtClean="0">
                           <a:solidFill>
                             <a:srgbClr val="00B050"/>
                           </a:solidFill>
@@ -27752,24 +27752,31 @@
                         <a:t>Benaderende</a:t>
                       </a:r>
                       <a:r>
-                        <a:rPr lang="nl-BE" sz="1400" baseline="0" dirty="0" smtClean="0">
+                        <a:rPr lang="nl-BE" sz="2000" baseline="0" dirty="0" smtClean="0">
                           <a:solidFill>
                             <a:srgbClr val="00B050"/>
                           </a:solidFill>
                         </a:rPr>
                         <a:t> inferentie nodig</a:t>
                       </a:r>
-                      <a:endParaRPr lang="nl-BE" sz="1400" dirty="0" smtClean="0">
+                      <a:endParaRPr lang="nl-BE" sz="2000" dirty="0" smtClean="0">
                         <a:solidFill>
                           <a:srgbClr val="00B050"/>
                         </a:solidFill>
                       </a:endParaRPr>
                     </a:p>
                   </a:txBody>
-                  <a:tcPr/>
+                  <a:tcPr marL="101377" marR="101377" marT="50688" marB="50688" anchor="ctr">
+                    <a:solidFill>
+                      <a:schemeClr val="accent3">
+                        <a:lumMod val="20000"/>
+                        <a:lumOff val="80000"/>
+                      </a:schemeClr>
+                    </a:solidFill>
+                  </a:tcPr>
                 </a:tc>
               </a:tr>
-              <a:tr h="433552">
+              <a:tr h="426686">
                 <a:tc>
                   <a:txBody>
                     <a:bodyPr/>
@@ -27777,13 +27784,13 @@
                     <a:p>
                       <a:pPr algn="ctr"/>
                       <a:r>
-                        <a:rPr lang="en-US" dirty="0" err="1" smtClean="0"/>
+                        <a:rPr lang="en-US" sz="2000" dirty="0" err="1" smtClean="0"/>
                         <a:t>Geheugengebruik</a:t>
                       </a:r>
-                      <a:endParaRPr lang="nl-BE" dirty="0"/>
+                      <a:endParaRPr lang="nl-BE" sz="2000" dirty="0"/>
                     </a:p>
                   </a:txBody>
-                  <a:tcPr/>
+                  <a:tcPr marL="101377" marR="101377" marT="50688" marB="50688" anchor="ctr"/>
                 </a:tc>
                 <a:tc>
                   <a:txBody>
@@ -27795,33 +27802,36 @@
                         <a:buChar char="•"/>
                       </a:pPr>
                       <a:r>
-                        <a:rPr lang="nl-BE" sz="1400" dirty="0" smtClean="0">
+                        <a:rPr lang="nl-BE" sz="2000" dirty="0" smtClean="0">
                           <a:solidFill>
                             <a:srgbClr val="FF0000"/>
                           </a:solidFill>
                         </a:rPr>
-                        <a:t>Pure functies</a:t>
+                        <a:t>Pure </a:t>
                       </a:r>
-                    </a:p>
-                    <a:p>
-                      <a:pPr marL="285750" indent="-285750" algn="l">
-                        <a:buFont typeface="Arial" pitchFamily="34" charset="0"/>
-                        <a:buChar char="•"/>
-                      </a:pPr>
                       <a:r>
-                        <a:rPr lang="nl-BE" sz="1400" dirty="0" smtClean="0">
+                        <a:rPr lang="nl-BE" sz="2000" dirty="0" smtClean="0">
                           <a:solidFill>
-                            <a:srgbClr val="2F4D5D"/>
+                            <a:srgbClr val="FF0000"/>
                           </a:solidFill>
                         </a:rPr>
-                        <a:t>?</a:t>
+                        <a:t>functies</a:t>
                       </a:r>
+                      <a:endParaRPr lang="nl-BE" sz="2000" dirty="0" smtClean="0">
+                        <a:solidFill>
+                          <a:srgbClr val="FF0000"/>
+                        </a:solidFill>
+                      </a:endParaRPr>
                     </a:p>
                   </a:txBody>
-                  <a:tcPr/>
+                  <a:tcPr marL="101377" marR="101377" marT="50688" marB="50688" anchor="ctr">
+                    <a:solidFill>
+                      <a:schemeClr val="bg1"/>
+                    </a:solidFill>
+                  </a:tcPr>
                 </a:tc>
               </a:tr>
-              <a:tr h="433552">
+              <a:tr h="576771">
                 <a:tc>
                   <a:txBody>
                     <a:bodyPr/>
@@ -27829,13 +27839,13 @@
                     <a:p>
                       <a:pPr algn="ctr"/>
                       <a:r>
-                        <a:rPr lang="nl-NL" dirty="0" smtClean="0"/>
-                        <a:t>Expressiviteit</a:t>
+                        <a:rPr lang="nl-BE" sz="2000" dirty="0" smtClean="0"/>
+                        <a:t>Uitbreidbaarheid</a:t>
                       </a:r>
-                      <a:endParaRPr lang="nl-BE" dirty="0"/>
+                      <a:endParaRPr lang="nl-BE" sz="2000" dirty="0"/>
                     </a:p>
                   </a:txBody>
-                  <a:tcPr/>
+                  <a:tcPr marL="101377" marR="101377" marT="50688" marB="50688" anchor="ctr"/>
                 </a:tc>
                 <a:tc>
                   <a:txBody>
@@ -27847,24 +27857,39 @@
                         <a:buChar char="•"/>
                       </a:pPr>
                       <a:r>
-                        <a:rPr lang="nl-BE" sz="1400" dirty="0" smtClean="0">
+                        <a:rPr lang="nl-BE" sz="2000" dirty="0" smtClean="0">
                           <a:solidFill>
-                            <a:srgbClr val="2F4D5D"/>
+                            <a:srgbClr val="00B050"/>
                           </a:solidFill>
                         </a:rPr>
-                        <a:t>?</a:t>
+                        <a:t>Uitstekend</a:t>
                       </a:r>
-                      <a:endParaRPr lang="nl-BE" sz="1400" dirty="0">
+                      <a:r>
+                        <a:rPr lang="nl-BE" sz="2000" baseline="0" dirty="0" smtClean="0">
+                          <a:solidFill>
+                            <a:srgbClr val="00B050"/>
+                          </a:solidFill>
+                        </a:rPr>
+                        <a:t> voor het veranderen van distributies</a:t>
+                      </a:r>
+                      <a:endParaRPr lang="nl-BE" sz="2000" dirty="0">
                         <a:solidFill>
-                          <a:srgbClr val="2F4D5D"/>
+                          <a:srgbClr val="00B050"/>
                         </a:solidFill>
                       </a:endParaRPr>
                     </a:p>
                   </a:txBody>
-                  <a:tcPr/>
+                  <a:tcPr marL="101377" marR="101377" marT="50688" marB="50688" anchor="ctr">
+                    <a:solidFill>
+                      <a:schemeClr val="accent3">
+                        <a:lumMod val="20000"/>
+                        <a:lumOff val="80000"/>
+                      </a:schemeClr>
+                    </a:solidFill>
+                  </a:tcPr>
                 </a:tc>
               </a:tr>
-              <a:tr h="433552">
+              <a:tr h="1067067">
                 <a:tc>
                   <a:txBody>
                     <a:bodyPr/>
@@ -27872,13 +27897,12 @@
                     <a:p>
                       <a:pPr algn="ctr"/>
                       <a:r>
-                        <a:rPr lang="nl-BE" dirty="0" smtClean="0"/>
-                        <a:t>Uitbreidbaarheid</a:t>
+                        <a:rPr lang="nl-BE" sz="2000" dirty="0" smtClean="0"/>
+                        <a:t>Tools beschikbaar</a:t>
                       </a:r>
-                      <a:endParaRPr lang="nl-BE" dirty="0"/>
                     </a:p>
                   </a:txBody>
-                  <a:tcPr/>
+                  <a:tcPr marL="101377" marR="101377" marT="50688" marB="50688" anchor="ctr"/>
                 </a:tc>
                 <a:tc>
                   <a:txBody>
@@ -27890,57 +27914,7 @@
                         <a:buChar char="•"/>
                       </a:pPr>
                       <a:r>
-                        <a:rPr lang="nl-BE" sz="1400" dirty="0" smtClean="0">
-                          <a:solidFill>
-                            <a:srgbClr val="00B050"/>
-                          </a:solidFill>
-                        </a:rPr>
-                        <a:t>Uitstekend</a:t>
-                      </a:r>
-                      <a:r>
-                        <a:rPr lang="nl-BE" sz="1400" baseline="0" dirty="0" smtClean="0">
-                          <a:solidFill>
-                            <a:srgbClr val="00B050"/>
-                          </a:solidFill>
-                        </a:rPr>
-                        <a:t> voor het veranderen van distributies</a:t>
-                      </a:r>
-                      <a:endParaRPr lang="nl-BE" sz="1400" dirty="0">
-                        <a:solidFill>
-                          <a:srgbClr val="00B050"/>
-                        </a:solidFill>
-                      </a:endParaRPr>
-                    </a:p>
-                  </a:txBody>
-                  <a:tcPr/>
-                </a:tc>
-              </a:tr>
-              <a:tr h="433552">
-                <a:tc>
-                  <a:txBody>
-                    <a:bodyPr/>
-                    <a:lstStyle/>
-                    <a:p>
-                      <a:pPr algn="ctr"/>
-                      <a:r>
-                        <a:rPr lang="nl-BE" dirty="0" smtClean="0"/>
-                        <a:t>Tools beschikbaar</a:t>
-                      </a:r>
-                    </a:p>
-                  </a:txBody>
-                  <a:tcPr/>
-                </a:tc>
-                <a:tc>
-                  <a:txBody>
-                    <a:bodyPr/>
-                    <a:lstStyle/>
-                    <a:p>
-                      <a:pPr marL="285750" indent="-285750" algn="l">
-                        <a:buFont typeface="Arial" pitchFamily="34" charset="0"/>
-                        <a:buChar char="•"/>
-                      </a:pPr>
-                      <a:r>
-                        <a:rPr lang="nl-BE" sz="1400" dirty="0" smtClean="0">
+                        <a:rPr lang="nl-BE" sz="2000" dirty="0" smtClean="0">
                           <a:solidFill>
                             <a:srgbClr val="FF0000"/>
                           </a:solidFill>
@@ -27948,7 +27922,7 @@
                         <a:t>Geen debugger,</a:t>
                       </a:r>
                       <a:r>
-                        <a:rPr lang="nl-BE" sz="1400" baseline="0" dirty="0" smtClean="0">
+                        <a:rPr lang="nl-BE" sz="2000" baseline="0" dirty="0" smtClean="0">
                           <a:solidFill>
                             <a:srgbClr val="FF0000"/>
                           </a:solidFill>
@@ -27962,24 +27936,28 @@
                         <a:buChar char="•"/>
                       </a:pPr>
                       <a:r>
-                        <a:rPr lang="nl-BE" sz="1400" baseline="0" dirty="0" smtClean="0">
+                        <a:rPr lang="nl-BE" sz="2000" baseline="0" dirty="0" smtClean="0">
                           <a:solidFill>
                             <a:srgbClr val="00B050"/>
                           </a:solidFill>
                         </a:rPr>
                         <a:t>Mogelijkheid om python te gebruiken</a:t>
                       </a:r>
-                      <a:endParaRPr lang="nl-BE" sz="1400" dirty="0">
+                      <a:endParaRPr lang="nl-BE" sz="2000" dirty="0">
                         <a:solidFill>
                           <a:srgbClr val="00B050"/>
                         </a:solidFill>
                       </a:endParaRPr>
                     </a:p>
                   </a:txBody>
-                  <a:tcPr/>
+                  <a:tcPr marL="101377" marR="101377" marT="50688" marB="50688" anchor="ctr">
+                    <a:solidFill>
+                      <a:schemeClr val="bg1"/>
+                    </a:solidFill>
+                  </a:tcPr>
                 </a:tc>
               </a:tr>
-              <a:tr h="433552">
+              <a:tr h="1067067">
                 <a:tc>
                   <a:txBody>
                     <a:bodyPr/>
@@ -27987,13 +27965,13 @@
                     <a:p>
                       <a:pPr algn="ctr"/>
                       <a:r>
-                        <a:rPr lang="nl-BE" dirty="0" smtClean="0"/>
+                        <a:rPr lang="nl-BE" sz="2000" dirty="0" smtClean="0"/>
                         <a:t>Moeilijkheidsgraad</a:t>
                       </a:r>
-                      <a:endParaRPr lang="nl-BE" dirty="0"/>
+                      <a:endParaRPr lang="nl-BE" sz="2000" dirty="0"/>
                     </a:p>
                   </a:txBody>
-                  <a:tcPr/>
+                  <a:tcPr marL="101377" marR="101377" marT="50688" marB="50688" anchor="ctr"/>
                 </a:tc>
                 <a:tc>
                   <a:txBody>
@@ -28005,7 +27983,7 @@
                         <a:buChar char="•"/>
                       </a:pPr>
                       <a:r>
-                        <a:rPr lang="nl-BE" sz="1400" dirty="0" smtClean="0">
+                        <a:rPr lang="nl-BE" sz="2000" dirty="0" smtClean="0">
                           <a:solidFill>
                             <a:srgbClr val="00B050"/>
                           </a:solidFill>
@@ -28013,7 +27991,7 @@
                         <a:t>Gebruiksvriendelijke installatie (python</a:t>
                       </a:r>
                       <a:r>
-                        <a:rPr lang="nl-BE" sz="1400" baseline="0" dirty="0" smtClean="0">
+                        <a:rPr lang="nl-BE" sz="2000" baseline="0" dirty="0" smtClean="0">
                           <a:solidFill>
                             <a:srgbClr val="00B050"/>
                           </a:solidFill>
@@ -28021,7 +27999,7 @@
                         <a:t> nodig</a:t>
                       </a:r>
                       <a:r>
-                        <a:rPr lang="nl-BE" sz="1400" dirty="0" smtClean="0">
+                        <a:rPr lang="nl-BE" sz="2000" dirty="0" smtClean="0">
                           <a:solidFill>
                             <a:srgbClr val="00B050"/>
                           </a:solidFill>
@@ -28035,7 +28013,7 @@
                         <a:buChar char="•"/>
                       </a:pPr>
                       <a:r>
-                        <a:rPr lang="nl-BE" sz="1400" dirty="0" smtClean="0">
+                        <a:rPr lang="nl-BE" sz="2000" dirty="0" smtClean="0">
                           <a:solidFill>
                             <a:srgbClr val="00B050"/>
                           </a:solidFill>
@@ -28043,7 +28021,7 @@
                         <a:t>Elegante</a:t>
                       </a:r>
                       <a:r>
-                        <a:rPr lang="nl-BE" sz="1400" baseline="0" dirty="0" smtClean="0">
+                        <a:rPr lang="nl-BE" sz="2000" baseline="0" dirty="0" smtClean="0">
                           <a:solidFill>
                             <a:srgbClr val="00B050"/>
                           </a:solidFill>
@@ -28051,7 +28029,7 @@
                         <a:t> code (subjectief) </a:t>
                       </a:r>
                       <a:r>
-                        <a:rPr lang="nl-BE" sz="1400" baseline="0" dirty="0" smtClean="0">
+                        <a:rPr lang="nl-BE" sz="2000" baseline="0" dirty="0" smtClean="0">
                           <a:solidFill>
                             <a:srgbClr val="00B050"/>
                           </a:solidFill>
@@ -28059,14 +28037,21 @@
                         </a:rPr>
                         <a:t> Makkelijker voor bugs te vinden</a:t>
                       </a:r>
-                      <a:endParaRPr lang="nl-BE" sz="1400" baseline="0" dirty="0" smtClean="0">
+                      <a:endParaRPr lang="nl-BE" sz="2000" baseline="0" dirty="0" smtClean="0">
                         <a:solidFill>
                           <a:srgbClr val="00B050"/>
                         </a:solidFill>
                       </a:endParaRPr>
                     </a:p>
                   </a:txBody>
-                  <a:tcPr/>
+                  <a:tcPr marL="101377" marR="101377" marT="50688" marB="50688" anchor="ctr">
+                    <a:solidFill>
+                      <a:schemeClr val="accent3">
+                        <a:lumMod val="20000"/>
+                        <a:lumOff val="80000"/>
+                      </a:schemeClr>
+                    </a:solidFill>
+                  </a:tcPr>
                 </a:tc>
               </a:tr>
             </a:tbl>
@@ -32060,6 +32045,13 @@
   <p:clrMapOvr>
     <a:masterClrMapping/>
   </p:clrMapOvr>
+  <p:timing>
+    <p:tnLst>
+      <p:par>
+        <p:cTn id="1" dur="indefinite" restart="never" nodeType="tmRoot"/>
+      </p:par>
+    </p:tnLst>
+  </p:timing>
 </p:sld>
 </file>
 
@@ -32800,7 +32792,7 @@
           <p:nvPr>
             <p:extLst>
               <p:ext uri="{D42A27DB-BD31-4B8C-83A1-F6EECF244321}">
-                <p14:modId xmlns:p14="http://schemas.microsoft.com/office/powerpoint/2010/main" val="2773375786"/>
+                <p14:modId xmlns:p14="http://schemas.microsoft.com/office/powerpoint/2010/main" val="2757469289"/>
               </p:ext>
             </p:extLst>
           </p:nvPr>
@@ -32834,7 +32826,7 @@
                       <a:endParaRPr lang="nl-BE" dirty="0"/>
                     </a:p>
                   </a:txBody>
-                  <a:tcPr/>
+                  <a:tcPr anchor="ctr"/>
                 </a:tc>
                 <a:tc>
                   <a:txBody>
@@ -32849,7 +32841,14 @@
                       <a:endParaRPr lang="nl-BE" dirty="0"/>
                     </a:p>
                   </a:txBody>
-                  <a:tcPr/>
+                  <a:tcPr>
+                    <a:solidFill>
+                      <a:schemeClr val="accent3">
+                        <a:lumMod val="20000"/>
+                        <a:lumOff val="80000"/>
+                      </a:schemeClr>
+                    </a:solidFill>
+                  </a:tcPr>
                 </a:tc>
                 <a:tc>
                   <a:txBody>
@@ -32864,7 +32863,14 @@
                       <a:endParaRPr lang="nl-BE" dirty="0"/>
                     </a:p>
                   </a:txBody>
-                  <a:tcPr/>
+                  <a:tcPr>
+                    <a:solidFill>
+                      <a:schemeClr val="accent3">
+                        <a:lumMod val="20000"/>
+                        <a:lumOff val="80000"/>
+                      </a:schemeClr>
+                    </a:solidFill>
+                  </a:tcPr>
                 </a:tc>
               </a:tr>
               <a:tr h="433552">
@@ -32881,7 +32887,7 @@
                       <a:endParaRPr lang="nl-BE" dirty="0"/>
                     </a:p>
                   </a:txBody>
-                  <a:tcPr/>
+                  <a:tcPr anchor="ctr"/>
                 </a:tc>
                 <a:tc>
                   <a:txBody>
@@ -32896,7 +32902,11 @@
                       <a:endParaRPr lang="nl-BE" dirty="0"/>
                     </a:p>
                   </a:txBody>
-                  <a:tcPr/>
+                  <a:tcPr>
+                    <a:solidFill>
+                      <a:schemeClr val="bg1"/>
+                    </a:solidFill>
+                  </a:tcPr>
                 </a:tc>
                 <a:tc>
                   <a:txBody>
@@ -32911,7 +32921,11 @@
                       <a:endParaRPr lang="nl-BE" dirty="0"/>
                     </a:p>
                   </a:txBody>
-                  <a:tcPr/>
+                  <a:tcPr>
+                    <a:solidFill>
+                      <a:schemeClr val="bg1"/>
+                    </a:solidFill>
+                  </a:tcPr>
                 </a:tc>
               </a:tr>
               <a:tr h="433552">
@@ -32928,7 +32942,7 @@
                       <a:endParaRPr lang="nl-BE" dirty="0"/>
                     </a:p>
                   </a:txBody>
-                  <a:tcPr/>
+                  <a:tcPr anchor="ctr"/>
                 </a:tc>
                 <a:tc>
                   <a:txBody>
@@ -32943,7 +32957,14 @@
                       <a:endParaRPr lang="nl-BE" dirty="0"/>
                     </a:p>
                   </a:txBody>
-                  <a:tcPr/>
+                  <a:tcPr>
+                    <a:solidFill>
+                      <a:schemeClr val="accent3">
+                        <a:lumMod val="20000"/>
+                        <a:lumOff val="80000"/>
+                      </a:schemeClr>
+                    </a:solidFill>
+                  </a:tcPr>
                 </a:tc>
                 <a:tc>
                   <a:txBody>
@@ -32958,7 +32979,14 @@
                       <a:endParaRPr lang="nl-BE" dirty="0"/>
                     </a:p>
                   </a:txBody>
-                  <a:tcPr/>
+                  <a:tcPr>
+                    <a:solidFill>
+                      <a:schemeClr val="accent3">
+                        <a:lumMod val="20000"/>
+                        <a:lumOff val="80000"/>
+                      </a:schemeClr>
+                    </a:solidFill>
+                  </a:tcPr>
                 </a:tc>
               </a:tr>
               <a:tr h="433552">
@@ -32975,7 +33003,7 @@
                       <a:endParaRPr lang="nl-BE" dirty="0"/>
                     </a:p>
                   </a:txBody>
-                  <a:tcPr/>
+                  <a:tcPr anchor="ctr"/>
                 </a:tc>
                 <a:tc>
                   <a:txBody>
@@ -32990,7 +33018,11 @@
                       <a:endParaRPr lang="nl-BE" dirty="0"/>
                     </a:p>
                   </a:txBody>
-                  <a:tcPr/>
+                  <a:tcPr>
+                    <a:solidFill>
+                      <a:schemeClr val="bg1"/>
+                    </a:solidFill>
+                  </a:tcPr>
                 </a:tc>
                 <a:tc>
                   <a:txBody>
@@ -33005,7 +33037,11 @@
                       <a:endParaRPr lang="nl-BE" dirty="0"/>
                     </a:p>
                   </a:txBody>
-                  <a:tcPr/>
+                  <a:tcPr>
+                    <a:solidFill>
+                      <a:schemeClr val="bg1"/>
+                    </a:solidFill>
+                  </a:tcPr>
                 </a:tc>
               </a:tr>
               <a:tr h="433552">
@@ -33021,7 +33057,7 @@
                       </a:r>
                     </a:p>
                   </a:txBody>
-                  <a:tcPr/>
+                  <a:tcPr anchor="ctr"/>
                 </a:tc>
                 <a:tc>
                   <a:txBody>
@@ -33036,7 +33072,14 @@
                       <a:endParaRPr lang="nl-BE" dirty="0"/>
                     </a:p>
                   </a:txBody>
-                  <a:tcPr/>
+                  <a:tcPr>
+                    <a:solidFill>
+                      <a:schemeClr val="accent3">
+                        <a:lumMod val="20000"/>
+                        <a:lumOff val="80000"/>
+                      </a:schemeClr>
+                    </a:solidFill>
+                  </a:tcPr>
                 </a:tc>
                 <a:tc>
                   <a:txBody>
@@ -33051,7 +33094,14 @@
                       <a:endParaRPr lang="nl-BE" dirty="0"/>
                     </a:p>
                   </a:txBody>
-                  <a:tcPr/>
+                  <a:tcPr>
+                    <a:solidFill>
+                      <a:schemeClr val="accent3">
+                        <a:lumMod val="20000"/>
+                        <a:lumOff val="80000"/>
+                      </a:schemeClr>
+                    </a:solidFill>
+                  </a:tcPr>
                 </a:tc>
               </a:tr>
               <a:tr h="433552">
@@ -33068,7 +33118,7 @@
                       <a:endParaRPr lang="nl-BE" dirty="0"/>
                     </a:p>
                   </a:txBody>
-                  <a:tcPr/>
+                  <a:tcPr anchor="ctr"/>
                 </a:tc>
                 <a:tc>
                   <a:txBody>
@@ -33083,7 +33133,11 @@
                       <a:endParaRPr lang="nl-BE" dirty="0"/>
                     </a:p>
                   </a:txBody>
-                  <a:tcPr/>
+                  <a:tcPr>
+                    <a:solidFill>
+                      <a:schemeClr val="bg1"/>
+                    </a:solidFill>
+                  </a:tcPr>
                 </a:tc>
                 <a:tc>
                   <a:txBody>
@@ -33098,7 +33152,11 @@
                       <a:endParaRPr lang="nl-BE" dirty="0"/>
                     </a:p>
                   </a:txBody>
-                  <a:tcPr/>
+                  <a:tcPr>
+                    <a:solidFill>
+                      <a:schemeClr val="bg1"/>
+                    </a:solidFill>
+                  </a:tcPr>
                 </a:tc>
               </a:tr>
               <a:tr h="433552">
@@ -33115,7 +33173,7 @@
                       <a:endParaRPr lang="nl-BE" dirty="0"/>
                     </a:p>
                   </a:txBody>
-                  <a:tcPr/>
+                  <a:tcPr anchor="ctr"/>
                 </a:tc>
                 <a:tc>
                   <a:txBody>
@@ -33130,7 +33188,14 @@
                       <a:endParaRPr lang="nl-BE" dirty="0"/>
                     </a:p>
                   </a:txBody>
-                  <a:tcPr/>
+                  <a:tcPr>
+                    <a:solidFill>
+                      <a:schemeClr val="accent3">
+                        <a:lumMod val="20000"/>
+                        <a:lumOff val="80000"/>
+                      </a:schemeClr>
+                    </a:solidFill>
+                  </a:tcPr>
                 </a:tc>
                 <a:tc>
                   <a:txBody>
@@ -33145,7 +33210,14 @@
                       <a:endParaRPr lang="nl-BE" dirty="0"/>
                     </a:p>
                   </a:txBody>
-                  <a:tcPr/>
+                  <a:tcPr>
+                    <a:solidFill>
+                      <a:schemeClr val="accent3">
+                        <a:lumMod val="20000"/>
+                        <a:lumOff val="80000"/>
+                      </a:schemeClr>
+                    </a:solidFill>
+                  </a:tcPr>
                 </a:tc>
               </a:tr>
             </a:tbl>
@@ -36839,7 +36911,7 @@
   <a:extraClrSchemeLst/>
   <a:extLst>
     <a:ext uri="{05A4C25C-085E-4340-85A3-A5531E510DB2}">
-      <thm15:themeFamily xmlns:thm15="http://schemas.microsoft.com/office/thememl/2012/main" xmlns="" name="Office Theme" id="{62F939B6-93AF-4DB8-9C6B-D6C7DFDC589F}" vid="{4A3C46E8-61CC-4603-A589-7422A47A8E4A}"/>
+      <thm15:themeFamily xmlns="" xmlns:thm15="http://schemas.microsoft.com/office/thememl/2012/main" name="Office Theme" id="{62F939B6-93AF-4DB8-9C6B-D6C7DFDC589F}" vid="{4A3C46E8-61CC-4603-A589-7422A47A8E4A}"/>
     </a:ext>
   </a:extLst>
 </a:theme>
@@ -37100,7 +37172,7 @@
   <a:extraClrSchemeLst/>
   <a:extLst>
     <a:ext uri="{05A4C25C-085E-4340-85A3-A5531E510DB2}">
-      <thm15:themeFamily xmlns:thm15="http://schemas.microsoft.com/office/thememl/2012/main" xmlns="" name="Office Theme" id="{62F939B6-93AF-4DB8-9C6B-D6C7DFDC589F}" vid="{4A3C46E8-61CC-4603-A589-7422A47A8E4A}"/>
+      <thm15:themeFamily xmlns="" xmlns:thm15="http://schemas.microsoft.com/office/thememl/2012/main" name="Office Theme" id="{62F939B6-93AF-4DB8-9C6B-D6C7DFDC589F}" vid="{4A3C46E8-61CC-4603-A589-7422A47A8E4A}"/>
     </a:ext>
   </a:extLst>
 </a:theme>
@@ -37361,7 +37433,7 @@
   <a:extraClrSchemeLst/>
   <a:extLst>
     <a:ext uri="{05A4C25C-085E-4340-85A3-A5531E510DB2}">
-      <thm15:themeFamily xmlns:thm15="http://schemas.microsoft.com/office/thememl/2012/main" xmlns="" name="Office Theme" id="{62F939B6-93AF-4DB8-9C6B-D6C7DFDC589F}" vid="{4A3C46E8-61CC-4603-A589-7422A47A8E4A}"/>
+      <thm15:themeFamily xmlns="" xmlns:thm15="http://schemas.microsoft.com/office/thememl/2012/main" name="Office Theme" id="{62F939B6-93AF-4DB8-9C6B-D6C7DFDC589F}" vid="{4A3C46E8-61CC-4603-A589-7422A47A8E4A}"/>
     </a:ext>
   </a:extLst>
 </a:theme>

</xml_diff>